<commit_message>
Content für Vortrag eingefügt, v1
</commit_message>
<xml_diff>
--- a/doc/task07/design.pptx
+++ b/doc/task07/design.pptx
@@ -5,20 +5,23 @@
     <p:sldMasterId id="2147483648" r:id="rId1"/>
   </p:sldMasterIdLst>
   <p:notesMasterIdLst>
-    <p:notesMasterId r:id="rId13"/>
+    <p:notesMasterId r:id="rId16"/>
   </p:notesMasterIdLst>
   <p:sldIdLst>
     <p:sldId id="256" r:id="rId2"/>
     <p:sldId id="270" r:id="rId3"/>
     <p:sldId id="283" r:id="rId4"/>
-    <p:sldId id="272" r:id="rId5"/>
-    <p:sldId id="281" r:id="rId6"/>
-    <p:sldId id="282" r:id="rId7"/>
-    <p:sldId id="284" r:id="rId8"/>
-    <p:sldId id="285" r:id="rId9"/>
-    <p:sldId id="286" r:id="rId10"/>
-    <p:sldId id="287" r:id="rId11"/>
-    <p:sldId id="280" r:id="rId12"/>
+    <p:sldId id="288" r:id="rId5"/>
+    <p:sldId id="272" r:id="rId6"/>
+    <p:sldId id="281" r:id="rId7"/>
+    <p:sldId id="289" r:id="rId8"/>
+    <p:sldId id="282" r:id="rId9"/>
+    <p:sldId id="284" r:id="rId10"/>
+    <p:sldId id="290" r:id="rId11"/>
+    <p:sldId id="285" r:id="rId12"/>
+    <p:sldId id="286" r:id="rId13"/>
+    <p:sldId id="287" r:id="rId14"/>
+    <p:sldId id="280" r:id="rId15"/>
   </p:sldIdLst>
   <p:sldSz cx="9144000" cy="6858000" type="screen4x3"/>
   <p:notesSz cx="6858000" cy="9144000"/>
@@ -119,7 +122,7 @@
   </p:defaultTextStyle>
   <p:extLst>
     <p:ext uri="{EFAFB233-063F-42B5-8137-9DF3F51BA10A}">
-      <p15:sldGuideLst xmlns="" xmlns:p15="http://schemas.microsoft.com/office/powerpoint/2012/main">
+      <p15:sldGuideLst xmlns:p15="http://schemas.microsoft.com/office/powerpoint/2012/main">
         <p15:guide id="1" orient="horz" pos="2160">
           <p15:clr>
             <a:srgbClr val="A4A3A4"/>
@@ -218,7 +221,7 @@
           <a:p>
             <a:fld id="{886089FC-270D-4247-A68F-0C2F3B33D2DF}" type="datetimeFigureOut">
               <a:rPr lang="de-CH" smtClean="0"/>
-              <a:t>13.04.2015</a:t>
+              <a:t>14.04.2015</a:t>
             </a:fld>
             <a:endParaRPr lang="de-CH"/>
           </a:p>
@@ -720,7 +723,7 @@
           <a:p>
             <a:fld id="{550EA7F5-C048-764E-A1BB-BCA3DE93A146}" type="datetimeFigureOut">
               <a:rPr lang="de-DE" smtClean="0"/>
-              <a:t>13.04.2015</a:t>
+              <a:t>14.04.2015</a:t>
             </a:fld>
             <a:endParaRPr lang="de-DE"/>
           </a:p>
@@ -890,7 +893,7 @@
           <a:p>
             <a:fld id="{550EA7F5-C048-764E-A1BB-BCA3DE93A146}" type="datetimeFigureOut">
               <a:rPr lang="de-DE" smtClean="0"/>
-              <a:t>13.04.2015</a:t>
+              <a:t>14.04.2015</a:t>
             </a:fld>
             <a:endParaRPr lang="de-DE"/>
           </a:p>
@@ -1070,7 +1073,7 @@
           <a:p>
             <a:fld id="{550EA7F5-C048-764E-A1BB-BCA3DE93A146}" type="datetimeFigureOut">
               <a:rPr lang="de-DE" smtClean="0"/>
-              <a:t>13.04.2015</a:t>
+              <a:t>14.04.2015</a:t>
             </a:fld>
             <a:endParaRPr lang="de-DE"/>
           </a:p>
@@ -1293,7 +1296,7 @@
           <a:p>
             <a:fld id="{550EA7F5-C048-764E-A1BB-BCA3DE93A146}" type="datetimeFigureOut">
               <a:rPr lang="de-DE" smtClean="0"/>
-              <a:t>13.04.2015</a:t>
+              <a:t>14.04.2015</a:t>
             </a:fld>
             <a:endParaRPr lang="de-DE"/>
           </a:p>
@@ -1588,7 +1591,7 @@
           <a:p>
             <a:fld id="{550EA7F5-C048-764E-A1BB-BCA3DE93A146}" type="datetimeFigureOut">
               <a:rPr lang="de-DE" smtClean="0"/>
-              <a:t>13.04.2015</a:t>
+              <a:t>14.04.2015</a:t>
             </a:fld>
             <a:endParaRPr lang="de-DE"/>
           </a:p>
@@ -1929,7 +1932,7 @@
           <a:p>
             <a:fld id="{550EA7F5-C048-764E-A1BB-BCA3DE93A146}" type="datetimeFigureOut">
               <a:rPr lang="de-DE" smtClean="0"/>
-              <a:t>13.04.2015</a:t>
+              <a:t>14.04.2015</a:t>
             </a:fld>
             <a:endParaRPr lang="de-DE"/>
           </a:p>
@@ -2400,7 +2403,7 @@
           <a:p>
             <a:fld id="{550EA7F5-C048-764E-A1BB-BCA3DE93A146}" type="datetimeFigureOut">
               <a:rPr lang="de-DE" smtClean="0"/>
-              <a:t>13.04.2015</a:t>
+              <a:t>14.04.2015</a:t>
             </a:fld>
             <a:endParaRPr lang="de-DE"/>
           </a:p>
@@ -2571,7 +2574,7 @@
           <a:p>
             <a:fld id="{550EA7F5-C048-764E-A1BB-BCA3DE93A146}" type="datetimeFigureOut">
               <a:rPr lang="de-DE" smtClean="0"/>
-              <a:t>13.04.2015</a:t>
+              <a:t>14.04.2015</a:t>
             </a:fld>
             <a:endParaRPr lang="de-DE"/>
           </a:p>
@@ -2666,7 +2669,7 @@
           <a:p>
             <a:fld id="{550EA7F5-C048-764E-A1BB-BCA3DE93A146}" type="datetimeFigureOut">
               <a:rPr lang="de-DE" smtClean="0"/>
-              <a:t>13.04.2015</a:t>
+              <a:t>14.04.2015</a:t>
             </a:fld>
             <a:endParaRPr lang="de-DE"/>
           </a:p>
@@ -2943,7 +2946,7 @@
           <a:p>
             <a:fld id="{550EA7F5-C048-764E-A1BB-BCA3DE93A146}" type="datetimeFigureOut">
               <a:rPr lang="de-DE" smtClean="0"/>
-              <a:t>13.04.2015</a:t>
+              <a:t>14.04.2015</a:t>
             </a:fld>
             <a:endParaRPr lang="de-DE"/>
           </a:p>
@@ -3196,7 +3199,7 @@
           <a:p>
             <a:fld id="{550EA7F5-C048-764E-A1BB-BCA3DE93A146}" type="datetimeFigureOut">
               <a:rPr lang="de-DE" smtClean="0"/>
-              <a:t>13.04.2015</a:t>
+              <a:t>14.04.2015</a:t>
             </a:fld>
             <a:endParaRPr lang="de-DE"/>
           </a:p>
@@ -3409,7 +3412,7 @@
           <a:p>
             <a:fld id="{550EA7F5-C048-764E-A1BB-BCA3DE93A146}" type="datetimeFigureOut">
               <a:rPr lang="de-DE" smtClean="0"/>
-              <a:t>13.04.2015</a:t>
+              <a:t>14.04.2015</a:t>
             </a:fld>
             <a:endParaRPr lang="de-DE"/>
           </a:p>
@@ -3919,6 +3922,407 @@
           <a:bodyPr/>
           <a:lstStyle/>
           <a:p>
+            <a:endParaRPr lang="de-CH"/>
+          </a:p>
+        </p:txBody>
+      </p:sp>
+      <p:sp>
+        <p:nvSpPr>
+          <p:cNvPr id="3" name="Inhaltsplatzhalter 2"/>
+          <p:cNvSpPr>
+            <a:spLocks noGrp="1"/>
+          </p:cNvSpPr>
+          <p:nvPr>
+            <p:ph idx="1"/>
+          </p:nvPr>
+        </p:nvSpPr>
+        <p:spPr/>
+        <p:txBody>
+          <a:bodyPr/>
+          <a:lstStyle/>
+          <a:p>
+            <a:r>
+              <a:rPr lang="de-CH" dirty="0" smtClean="0"/>
+              <a:t>App will </a:t>
+            </a:r>
+            <a:r>
+              <a:rPr lang="de-CH" dirty="0" err="1" smtClean="0"/>
+              <a:t>Activity</a:t>
+            </a:r>
+            <a:r>
+              <a:rPr lang="de-CH" dirty="0" smtClean="0"/>
+              <a:t> von </a:t>
+            </a:r>
+            <a:r>
+              <a:rPr lang="de-CH" dirty="0" err="1" smtClean="0"/>
+              <a:t>LifeUp</a:t>
+            </a:r>
+            <a:r>
+              <a:rPr lang="de-CH" dirty="0" smtClean="0"/>
+              <a:t> prüfen</a:t>
+            </a:r>
+          </a:p>
+          <a:p>
+            <a:r>
+              <a:rPr lang="de-CH" dirty="0" smtClean="0"/>
+              <a:t>App Übergibt </a:t>
+            </a:r>
+            <a:r>
+              <a:rPr lang="de-CH" dirty="0" err="1" smtClean="0"/>
+              <a:t>LifeUp</a:t>
+            </a:r>
+            <a:r>
+              <a:rPr lang="de-CH" dirty="0" smtClean="0"/>
+              <a:t> ein Bild zum prüfen</a:t>
+            </a:r>
+          </a:p>
+          <a:p>
+            <a:r>
+              <a:rPr lang="de-CH" dirty="0" smtClean="0"/>
+              <a:t>Gibt </a:t>
+            </a:r>
+            <a:r>
+              <a:rPr lang="de-CH" dirty="0" err="1" smtClean="0"/>
+              <a:t>LifeUp</a:t>
+            </a:r>
+            <a:r>
+              <a:rPr lang="de-CH" dirty="0" smtClean="0"/>
+              <a:t> </a:t>
+            </a:r>
+            <a:r>
+              <a:rPr lang="de-CH" dirty="0" err="1" smtClean="0"/>
+              <a:t>Success</a:t>
+            </a:r>
+            <a:r>
+              <a:rPr lang="de-CH" dirty="0" smtClean="0"/>
+              <a:t> zurück, werden Punkte addiert</a:t>
+            </a:r>
+          </a:p>
+          <a:p>
+            <a:r>
+              <a:rPr lang="de-CH" dirty="0" err="1" smtClean="0"/>
+              <a:t>Lv</a:t>
+            </a:r>
+            <a:r>
+              <a:rPr lang="de-CH" dirty="0" smtClean="0"/>
+              <a:t> </a:t>
+            </a:r>
+            <a:r>
+              <a:rPr lang="de-CH" dirty="0" err="1" smtClean="0"/>
+              <a:t>up</a:t>
+            </a:r>
+            <a:r>
+              <a:rPr lang="de-CH" dirty="0" smtClean="0"/>
+              <a:t> wird geprüft</a:t>
+            </a:r>
+          </a:p>
+          <a:p>
+            <a:r>
+              <a:rPr lang="de-CH" dirty="0" smtClean="0"/>
+              <a:t>Wenn </a:t>
+            </a:r>
+            <a:r>
+              <a:rPr lang="de-CH" dirty="0" err="1" smtClean="0"/>
+              <a:t>Lv</a:t>
+            </a:r>
+            <a:r>
+              <a:rPr lang="de-CH" dirty="0" smtClean="0"/>
+              <a:t> </a:t>
+            </a:r>
+            <a:r>
+              <a:rPr lang="de-CH" dirty="0" err="1" smtClean="0"/>
+              <a:t>up</a:t>
+            </a:r>
+            <a:r>
+              <a:rPr lang="de-CH" dirty="0" smtClean="0"/>
+              <a:t> </a:t>
+            </a:r>
+            <a:r>
+              <a:rPr lang="de-CH" dirty="0" err="1" smtClean="0"/>
+              <a:t>zustane</a:t>
+            </a:r>
+            <a:r>
+              <a:rPr lang="de-CH" dirty="0" smtClean="0"/>
+              <a:t> kommt, wird dies der </a:t>
+            </a:r>
+            <a:r>
+              <a:rPr lang="de-CH" dirty="0" err="1" smtClean="0"/>
+              <a:t>Activity</a:t>
+            </a:r>
+            <a:r>
+              <a:rPr lang="de-CH" dirty="0" smtClean="0"/>
+              <a:t> gesendet</a:t>
+            </a:r>
+          </a:p>
+          <a:p>
+            <a:r>
+              <a:rPr lang="de-CH" dirty="0" err="1" smtClean="0"/>
+              <a:t>Activity</a:t>
+            </a:r>
+            <a:r>
+              <a:rPr lang="de-CH" dirty="0" smtClean="0"/>
+              <a:t> sendet Log an Server Klinik</a:t>
+            </a:r>
+            <a:endParaRPr lang="de-CH" dirty="0"/>
+          </a:p>
+        </p:txBody>
+      </p:sp>
+    </p:spTree>
+    <p:extLst>
+      <p:ext uri="{BB962C8B-B14F-4D97-AF65-F5344CB8AC3E}">
+        <p14:creationId xmlns:p14="http://schemas.microsoft.com/office/powerpoint/2010/main" val="2278301276"/>
+      </p:ext>
+    </p:extLst>
+  </p:cSld>
+  <p:clrMapOvr>
+    <a:masterClrMapping/>
+  </p:clrMapOvr>
+</p:sld>
+</file>
+
+<file path=ppt/slides/slide11.xml><?xml version="1.0" encoding="utf-8"?>
+<p:sld xmlns:a="http://schemas.openxmlformats.org/drawingml/2006/main" xmlns:r="http://schemas.openxmlformats.org/officeDocument/2006/relationships" xmlns:p="http://schemas.openxmlformats.org/presentationml/2006/main">
+  <p:cSld>
+    <p:spTree>
+      <p:nvGrpSpPr>
+        <p:cNvPr id="1" name=""/>
+        <p:cNvGrpSpPr/>
+        <p:nvPr/>
+      </p:nvGrpSpPr>
+      <p:grpSpPr>
+        <a:xfrm>
+          <a:off x="0" y="0"/>
+          <a:ext cx="0" cy="0"/>
+          <a:chOff x="0" y="0"/>
+          <a:chExt cx="0" cy="0"/>
+        </a:xfrm>
+      </p:grpSpPr>
+      <p:sp>
+        <p:nvSpPr>
+          <p:cNvPr id="2" name="Titel 1"/>
+          <p:cNvSpPr>
+            <a:spLocks noGrp="1"/>
+          </p:cNvSpPr>
+          <p:nvPr>
+            <p:ph type="title"/>
+          </p:nvPr>
+        </p:nvSpPr>
+        <p:spPr/>
+        <p:txBody>
+          <a:bodyPr/>
+          <a:lstStyle/>
+          <a:p>
+            <a:endParaRPr lang="de-CH"/>
+          </a:p>
+        </p:txBody>
+      </p:sp>
+      <p:pic>
+        <p:nvPicPr>
+          <p:cNvPr id="7170" name="Picture 2" descr="C:\Users\James\workspaceLuna\sed_projekt\doc\task07\classDiagrammSED.png"/>
+          <p:cNvPicPr>
+            <a:picLocks noGrp="1" noChangeAspect="1" noChangeArrowheads="1"/>
+          </p:cNvPicPr>
+          <p:nvPr>
+            <p:ph idx="1"/>
+          </p:nvPr>
+        </p:nvPicPr>
+        <p:blipFill>
+          <a:blip r:embed="rId2">
+            <a:extLst>
+              <a:ext uri="{28A0092B-C50C-407E-A947-70E740481C1C}">
+                <a14:useLocalDpi xmlns:a14="http://schemas.microsoft.com/office/drawing/2010/main" val="0"/>
+              </a:ext>
+            </a:extLst>
+          </a:blip>
+          <a:srcRect/>
+          <a:stretch>
+            <a:fillRect/>
+          </a:stretch>
+        </p:blipFill>
+        <p:spPr bwMode="auto">
+          <a:xfrm>
+            <a:off x="285760" y="0"/>
+            <a:ext cx="8572500" cy="6850172"/>
+          </a:xfrm>
+          <a:prstGeom prst="rect">
+            <a:avLst/>
+          </a:prstGeom>
+          <a:noFill/>
+          <a:extLst>
+            <a:ext uri="{909E8E84-426E-40DD-AFC4-6F175D3DCCD1}">
+              <a14:hiddenFill xmlns:a14="http://schemas.microsoft.com/office/drawing/2010/main">
+                <a:solidFill>
+                  <a:srgbClr val="FFFFFF"/>
+                </a:solidFill>
+              </a14:hiddenFill>
+            </a:ext>
+          </a:extLst>
+        </p:spPr>
+      </p:pic>
+    </p:spTree>
+    <p:extLst>
+      <p:ext uri="{BB962C8B-B14F-4D97-AF65-F5344CB8AC3E}">
+        <p14:creationId xmlns:p14="http://schemas.microsoft.com/office/powerpoint/2010/main" val="3752890489"/>
+      </p:ext>
+    </p:extLst>
+  </p:cSld>
+  <p:clrMapOvr>
+    <a:masterClrMapping/>
+  </p:clrMapOvr>
+  <p:timing>
+    <p:tnLst>
+      <p:par>
+        <p:cTn id="1" dur="indefinite" restart="never" nodeType="tmRoot"/>
+      </p:par>
+    </p:tnLst>
+  </p:timing>
+</p:sld>
+</file>
+
+<file path=ppt/slides/slide12.xml><?xml version="1.0" encoding="utf-8"?>
+<p:sld xmlns:a="http://schemas.openxmlformats.org/drawingml/2006/main" xmlns:r="http://schemas.openxmlformats.org/officeDocument/2006/relationships" xmlns:p="http://schemas.openxmlformats.org/presentationml/2006/main">
+  <p:cSld>
+    <p:spTree>
+      <p:nvGrpSpPr>
+        <p:cNvPr id="1" name=""/>
+        <p:cNvGrpSpPr/>
+        <p:nvPr/>
+      </p:nvGrpSpPr>
+      <p:grpSpPr>
+        <a:xfrm>
+          <a:off x="0" y="0"/>
+          <a:ext cx="0" cy="0"/>
+          <a:chOff x="0" y="0"/>
+          <a:chExt cx="0" cy="0"/>
+        </a:xfrm>
+      </p:grpSpPr>
+      <p:sp>
+        <p:nvSpPr>
+          <p:cNvPr id="2" name="Titel 1"/>
+          <p:cNvSpPr>
+            <a:spLocks noGrp="1"/>
+          </p:cNvSpPr>
+          <p:nvPr>
+            <p:ph type="title"/>
+          </p:nvPr>
+        </p:nvSpPr>
+        <p:spPr/>
+        <p:txBody>
+          <a:bodyPr/>
+          <a:lstStyle/>
+          <a:p>
+            <a:r>
+              <a:rPr lang="en-US" dirty="0" smtClean="0"/>
+              <a:t>Teilausschnitt1</a:t>
+            </a:r>
+            <a:endParaRPr lang="de-CH" dirty="0"/>
+          </a:p>
+        </p:txBody>
+      </p:sp>
+      <p:sp>
+        <p:nvSpPr>
+          <p:cNvPr id="3" name="Inhaltsplatzhalter 2"/>
+          <p:cNvSpPr>
+            <a:spLocks noGrp="1"/>
+          </p:cNvSpPr>
+          <p:nvPr>
+            <p:ph idx="1"/>
+          </p:nvPr>
+        </p:nvSpPr>
+        <p:spPr/>
+        <p:txBody>
+          <a:bodyPr/>
+          <a:lstStyle/>
+          <a:p>
+            <a:r>
+              <a:rPr lang="de-CH" dirty="0" smtClean="0"/>
+              <a:t>Patient App hat Relationen zu Kalender, Emergency und </a:t>
+            </a:r>
+            <a:r>
+              <a:rPr lang="de-CH" dirty="0" err="1" smtClean="0"/>
+              <a:t>LifeUp</a:t>
+            </a:r>
+            <a:endParaRPr lang="de-CH" dirty="0" smtClean="0"/>
+          </a:p>
+          <a:p>
+            <a:r>
+              <a:rPr lang="de-CH" dirty="0" smtClean="0"/>
+              <a:t>Daten vom Server werden statt von den obigen Relationen vom </a:t>
+            </a:r>
+            <a:r>
+              <a:rPr lang="de-CH" dirty="0" err="1" smtClean="0"/>
+              <a:t>ClinicConnector</a:t>
+            </a:r>
+            <a:r>
+              <a:rPr lang="de-CH" dirty="0" smtClean="0"/>
+              <a:t> geholt -&gt; zentrale Sammelstelle</a:t>
+            </a:r>
+          </a:p>
+          <a:p>
+            <a:r>
+              <a:rPr lang="de-CH" dirty="0" err="1" smtClean="0"/>
+              <a:t>EmergencyStep</a:t>
+            </a:r>
+            <a:r>
+              <a:rPr lang="de-CH" dirty="0" smtClean="0"/>
+              <a:t>, als Relation zu Emergency, hat jeweils einen Kontakt für Persönliche Hilfe</a:t>
+            </a:r>
+            <a:endParaRPr lang="de-CH" dirty="0"/>
+          </a:p>
+        </p:txBody>
+      </p:sp>
+    </p:spTree>
+    <p:extLst>
+      <p:ext uri="{BB962C8B-B14F-4D97-AF65-F5344CB8AC3E}">
+        <p14:creationId xmlns:p14="http://schemas.microsoft.com/office/powerpoint/2010/main" val="934797876"/>
+      </p:ext>
+    </p:extLst>
+  </p:cSld>
+  <p:clrMapOvr>
+    <a:masterClrMapping/>
+  </p:clrMapOvr>
+  <p:timing>
+    <p:tnLst>
+      <p:par>
+        <p:cTn id="1" dur="indefinite" restart="never" nodeType="tmRoot"/>
+      </p:par>
+    </p:tnLst>
+  </p:timing>
+</p:sld>
+</file>
+
+<file path=ppt/slides/slide13.xml><?xml version="1.0" encoding="utf-8"?>
+<p:sld xmlns:a="http://schemas.openxmlformats.org/drawingml/2006/main" xmlns:r="http://schemas.openxmlformats.org/officeDocument/2006/relationships" xmlns:p="http://schemas.openxmlformats.org/presentationml/2006/main">
+  <p:cSld>
+    <p:spTree>
+      <p:nvGrpSpPr>
+        <p:cNvPr id="1" name=""/>
+        <p:cNvGrpSpPr/>
+        <p:nvPr/>
+      </p:nvGrpSpPr>
+      <p:grpSpPr>
+        <a:xfrm>
+          <a:off x="0" y="0"/>
+          <a:ext cx="0" cy="0"/>
+          <a:chOff x="0" y="0"/>
+          <a:chExt cx="0" cy="0"/>
+        </a:xfrm>
+      </p:grpSpPr>
+      <p:sp>
+        <p:nvSpPr>
+          <p:cNvPr id="2" name="Titel 1"/>
+          <p:cNvSpPr>
+            <a:spLocks noGrp="1"/>
+          </p:cNvSpPr>
+          <p:nvPr>
+            <p:ph type="title"/>
+          </p:nvPr>
+        </p:nvSpPr>
+        <p:spPr/>
+        <p:txBody>
+          <a:bodyPr/>
+          <a:lstStyle/>
+          <a:p>
             <a:r>
               <a:rPr lang="en-US" dirty="0" smtClean="0"/>
               <a:t>Teilausschnitt2</a:t>
@@ -3941,6 +4345,72 @@
         <p:txBody>
           <a:bodyPr/>
           <a:lstStyle/>
+          <a:p>
+            <a:r>
+              <a:rPr lang="de-CH" dirty="0" err="1" smtClean="0"/>
+              <a:t>Activities</a:t>
+            </a:r>
+            <a:r>
+              <a:rPr lang="de-CH" dirty="0" smtClean="0"/>
+              <a:t> haben Relationen zu GPS Daten oder Bilder -&gt; Überprüfung in jedem Fall möglich</a:t>
+            </a:r>
+          </a:p>
+          <a:p>
+            <a:r>
+              <a:rPr lang="de-CH" dirty="0" err="1" smtClean="0"/>
+              <a:t>Calendar</a:t>
+            </a:r>
+            <a:r>
+              <a:rPr lang="de-CH" dirty="0" err="1" smtClean="0"/>
+              <a:t>Entry</a:t>
+            </a:r>
+            <a:r>
+              <a:rPr lang="de-CH" dirty="0" smtClean="0"/>
+              <a:t> hat Relation zu </a:t>
+            </a:r>
+            <a:r>
+              <a:rPr lang="de-CH" dirty="0" err="1" smtClean="0"/>
+              <a:t>Appointments</a:t>
+            </a:r>
+            <a:r>
+              <a:rPr lang="de-CH" dirty="0" smtClean="0"/>
+              <a:t>, </a:t>
+            </a:r>
+            <a:r>
+              <a:rPr lang="de-CH" dirty="0" err="1" smtClean="0"/>
+              <a:t>Medication</a:t>
+            </a:r>
+            <a:r>
+              <a:rPr lang="de-CH" dirty="0" smtClean="0"/>
+              <a:t> und </a:t>
+            </a:r>
+            <a:r>
+              <a:rPr lang="de-CH" dirty="0" err="1" smtClean="0"/>
+              <a:t>Acivities</a:t>
+            </a:r>
+            <a:r>
+              <a:rPr lang="de-CH" dirty="0" smtClean="0"/>
+              <a:t> -&gt; zentrale Klasse als Sammelstelle für den Kalender</a:t>
+            </a:r>
+          </a:p>
+          <a:p>
+            <a:r>
+              <a:rPr lang="de-CH" dirty="0" err="1" smtClean="0"/>
+              <a:t>Activities</a:t>
+            </a:r>
+            <a:r>
+              <a:rPr lang="de-CH" dirty="0" smtClean="0"/>
+              <a:t> werden sowohl im Kalender als auch im Spiel </a:t>
+            </a:r>
+            <a:r>
+              <a:rPr lang="de-CH" dirty="0" err="1" smtClean="0"/>
+              <a:t>LifeUp</a:t>
+            </a:r>
+            <a:r>
+              <a:rPr lang="de-CH" dirty="0" smtClean="0"/>
+              <a:t> dargestellt </a:t>
+            </a:r>
+          </a:p>
           <a:p>
             <a:endParaRPr lang="de-CH" dirty="0"/>
           </a:p>
@@ -3966,7 +4436,7 @@
 </p:sld>
 </file>
 
-<file path=ppt/slides/slide11.xml><?xml version="1.0" encoding="utf-8"?>
+<file path=ppt/slides/slide14.xml><?xml version="1.0" encoding="utf-8"?>
 <p:sld xmlns:a="http://schemas.openxmlformats.org/drawingml/2006/main" xmlns:r="http://schemas.openxmlformats.org/officeDocument/2006/relationships" xmlns:p="http://schemas.openxmlformats.org/presentationml/2006/main">
   <p:cSld>
     <p:spTree>
@@ -4293,6 +4763,177 @@
       </p:grpSpPr>
       <p:sp>
         <p:nvSpPr>
+          <p:cNvPr id="2" name="Titel 1"/>
+          <p:cNvSpPr>
+            <a:spLocks noGrp="1"/>
+          </p:cNvSpPr>
+          <p:nvPr>
+            <p:ph type="title"/>
+          </p:nvPr>
+        </p:nvSpPr>
+        <p:spPr/>
+        <p:txBody>
+          <a:bodyPr/>
+          <a:lstStyle/>
+          <a:p>
+            <a:r>
+              <a:rPr lang="de-CH" dirty="0" smtClean="0"/>
+              <a:t>Domain Model</a:t>
+            </a:r>
+            <a:endParaRPr lang="de-CH" dirty="0"/>
+          </a:p>
+        </p:txBody>
+      </p:sp>
+      <p:sp>
+        <p:nvSpPr>
+          <p:cNvPr id="3" name="Inhaltsplatzhalter 2"/>
+          <p:cNvSpPr>
+            <a:spLocks noGrp="1"/>
+          </p:cNvSpPr>
+          <p:nvPr>
+            <p:ph idx="1"/>
+          </p:nvPr>
+        </p:nvSpPr>
+        <p:spPr/>
+        <p:txBody>
+          <a:bodyPr>
+            <a:normAutofit lnSpcReduction="10000"/>
+          </a:bodyPr>
+          <a:lstStyle/>
+          <a:p>
+            <a:r>
+              <a:rPr lang="de-CH" dirty="0" err="1" smtClean="0"/>
+              <a:t>Calendar</a:t>
+            </a:r>
+            <a:r>
+              <a:rPr lang="de-CH" dirty="0" smtClean="0"/>
+              <a:t> enthält sämtliche </a:t>
+            </a:r>
+            <a:r>
+              <a:rPr lang="de-CH" dirty="0" err="1" smtClean="0"/>
+              <a:t>Calendar</a:t>
+            </a:r>
+            <a:r>
+              <a:rPr lang="de-CH" dirty="0" smtClean="0"/>
+              <a:t> </a:t>
+            </a:r>
+            <a:r>
+              <a:rPr lang="de-CH" dirty="0" err="1" smtClean="0"/>
+              <a:t>Entries</a:t>
+            </a:r>
+            <a:endParaRPr lang="de-CH" dirty="0" smtClean="0"/>
+          </a:p>
+          <a:p>
+            <a:r>
+              <a:rPr lang="de-CH" dirty="0" smtClean="0"/>
+              <a:t>Jedem Entry ist eine </a:t>
+            </a:r>
+            <a:r>
+              <a:rPr lang="de-CH" dirty="0" err="1" smtClean="0"/>
+              <a:t>Activity</a:t>
+            </a:r>
+            <a:r>
+              <a:rPr lang="de-CH" dirty="0"/>
+              <a:t>,</a:t>
+            </a:r>
+            <a:r>
+              <a:rPr lang="de-CH" dirty="0" smtClean="0"/>
+              <a:t> ein </a:t>
+            </a:r>
+            <a:r>
+              <a:rPr lang="de-CH" dirty="0" err="1" smtClean="0"/>
+              <a:t>Appointment</a:t>
+            </a:r>
+            <a:r>
+              <a:rPr lang="de-CH" dirty="0" smtClean="0"/>
+              <a:t> oder eine </a:t>
+            </a:r>
+            <a:r>
+              <a:rPr lang="de-CH" dirty="0" err="1" smtClean="0"/>
+              <a:t>Medication</a:t>
+            </a:r>
+            <a:r>
+              <a:rPr lang="de-CH" dirty="0" smtClean="0"/>
+              <a:t> zugewiesen</a:t>
+            </a:r>
+          </a:p>
+          <a:p>
+            <a:r>
+              <a:rPr lang="de-CH" dirty="0" smtClean="0"/>
+              <a:t>Bei </a:t>
+            </a:r>
+            <a:r>
+              <a:rPr lang="de-CH" dirty="0" err="1" smtClean="0"/>
+              <a:t>Appointments</a:t>
+            </a:r>
+            <a:r>
+              <a:rPr lang="de-CH" dirty="0" smtClean="0"/>
+              <a:t> kann der Arzt kontaktiert werden</a:t>
+            </a:r>
+          </a:p>
+          <a:p>
+            <a:r>
+              <a:rPr lang="de-CH" dirty="0" err="1" smtClean="0"/>
+              <a:t>Activities</a:t>
+            </a:r>
+            <a:r>
+              <a:rPr lang="de-CH" dirty="0" smtClean="0"/>
+              <a:t> sind mit </a:t>
+            </a:r>
+            <a:r>
+              <a:rPr lang="de-CH" dirty="0" err="1" smtClean="0"/>
+              <a:t>LifeUp</a:t>
+            </a:r>
+            <a:r>
+              <a:rPr lang="de-CH" dirty="0" smtClean="0"/>
+              <a:t> verbunden und werden dort angezeigt</a:t>
+            </a:r>
+          </a:p>
+          <a:p>
+            <a:r>
+              <a:rPr lang="de-CH" dirty="0" err="1" smtClean="0"/>
+              <a:t>KlinikConnector</a:t>
+            </a:r>
+            <a:r>
+              <a:rPr lang="de-CH" dirty="0" smtClean="0"/>
+              <a:t> ist zuständig für die Notfallnummern</a:t>
+            </a:r>
+            <a:endParaRPr lang="de-CH" dirty="0"/>
+          </a:p>
+        </p:txBody>
+      </p:sp>
+    </p:spTree>
+    <p:extLst>
+      <p:ext uri="{BB962C8B-B14F-4D97-AF65-F5344CB8AC3E}">
+        <p14:creationId xmlns:p14="http://schemas.microsoft.com/office/powerpoint/2010/main" val="2806369572"/>
+      </p:ext>
+    </p:extLst>
+  </p:cSld>
+  <p:clrMapOvr>
+    <a:masterClrMapping/>
+  </p:clrMapOvr>
+</p:sld>
+</file>
+
+<file path=ppt/slides/slide5.xml><?xml version="1.0" encoding="utf-8"?>
+<p:sld xmlns:a="http://schemas.openxmlformats.org/drawingml/2006/main" xmlns:r="http://schemas.openxmlformats.org/officeDocument/2006/relationships" xmlns:p="http://schemas.openxmlformats.org/presentationml/2006/main">
+  <p:cSld>
+    <p:spTree>
+      <p:nvGrpSpPr>
+        <p:cNvPr id="1" name=""/>
+        <p:cNvGrpSpPr/>
+        <p:nvPr/>
+      </p:nvGrpSpPr>
+      <p:grpSpPr>
+        <a:xfrm>
+          <a:off x="0" y="0"/>
+          <a:ext cx="0" cy="0"/>
+          <a:chOff x="0" y="0"/>
+          <a:chExt cx="0" cy="0"/>
+        </a:xfrm>
+      </p:grpSpPr>
+      <p:sp>
+        <p:nvSpPr>
           <p:cNvPr id="2" name="Title 1"/>
           <p:cNvSpPr>
             <a:spLocks noGrp="1"/>
@@ -4337,8 +4978,8 @@
         </p:blipFill>
         <p:spPr bwMode="auto">
           <a:xfrm>
-            <a:off x="3310220" y="1417638"/>
-            <a:ext cx="2581275" cy="5391150"/>
+            <a:off x="3310220" y="1516114"/>
+            <a:ext cx="2581275" cy="5341886"/>
           </a:xfrm>
           <a:prstGeom prst="rect">
             <a:avLst/>
@@ -4494,7 +5135,7 @@
 </p:sld>
 </file>
 
-<file path=ppt/slides/slide5.xml><?xml version="1.0" encoding="utf-8"?>
+<file path=ppt/slides/slide6.xml><?xml version="1.0" encoding="utf-8"?>
 <p:sld xmlns:a="http://schemas.openxmlformats.org/drawingml/2006/main" xmlns:r="http://schemas.openxmlformats.org/officeDocument/2006/relationships" xmlns:p="http://schemas.openxmlformats.org/presentationml/2006/main">
   <p:cSld>
     <p:spTree>
@@ -4610,7 +5251,149 @@
 </p:sld>
 </file>
 
-<file path=ppt/slides/slide6.xml><?xml version="1.0" encoding="utf-8"?>
+<file path=ppt/slides/slide7.xml><?xml version="1.0" encoding="utf-8"?>
+<p:sld xmlns:a="http://schemas.openxmlformats.org/drawingml/2006/main" xmlns:r="http://schemas.openxmlformats.org/officeDocument/2006/relationships" xmlns:p="http://schemas.openxmlformats.org/presentationml/2006/main">
+  <p:cSld>
+    <p:spTree>
+      <p:nvGrpSpPr>
+        <p:cNvPr id="1" name=""/>
+        <p:cNvGrpSpPr/>
+        <p:nvPr/>
+      </p:nvGrpSpPr>
+      <p:grpSpPr>
+        <a:xfrm>
+          <a:off x="0" y="0"/>
+          <a:ext cx="0" cy="0"/>
+          <a:chOff x="0" y="0"/>
+          <a:chExt cx="0" cy="0"/>
+        </a:xfrm>
+      </p:grpSpPr>
+      <p:sp>
+        <p:nvSpPr>
+          <p:cNvPr id="2" name="Titel 1"/>
+          <p:cNvSpPr>
+            <a:spLocks noGrp="1"/>
+          </p:cNvSpPr>
+          <p:nvPr>
+            <p:ph type="title"/>
+          </p:nvPr>
+        </p:nvSpPr>
+        <p:spPr/>
+        <p:txBody>
+          <a:bodyPr/>
+          <a:lstStyle/>
+          <a:p>
+            <a:r>
+              <a:rPr lang="de-CH" dirty="0" err="1" smtClean="0"/>
+              <a:t>Activities</a:t>
+            </a:r>
+            <a:r>
+              <a:rPr lang="de-CH" dirty="0" smtClean="0"/>
+              <a:t> Updaten</a:t>
+            </a:r>
+            <a:endParaRPr lang="de-CH" dirty="0"/>
+          </a:p>
+        </p:txBody>
+      </p:sp>
+      <p:sp>
+        <p:nvSpPr>
+          <p:cNvPr id="3" name="Inhaltsplatzhalter 2"/>
+          <p:cNvSpPr>
+            <a:spLocks noGrp="1"/>
+          </p:cNvSpPr>
+          <p:nvPr>
+            <p:ph idx="1"/>
+          </p:nvPr>
+        </p:nvSpPr>
+        <p:spPr/>
+        <p:txBody>
+          <a:bodyPr/>
+          <a:lstStyle/>
+          <a:p>
+            <a:r>
+              <a:rPr lang="de-CH" dirty="0" err="1" smtClean="0"/>
+              <a:t>Clinic</a:t>
+            </a:r>
+            <a:r>
+              <a:rPr lang="de-CH" dirty="0" smtClean="0"/>
+              <a:t> System wird nach </a:t>
+            </a:r>
+            <a:r>
+              <a:rPr lang="de-CH" dirty="0" err="1" smtClean="0"/>
+              <a:t>Entries</a:t>
+            </a:r>
+            <a:r>
+              <a:rPr lang="de-CH" dirty="0" smtClean="0"/>
+              <a:t> gefragt</a:t>
+            </a:r>
+          </a:p>
+          <a:p>
+            <a:r>
+              <a:rPr lang="de-CH" dirty="0" err="1" smtClean="0"/>
+              <a:t>Clinic</a:t>
+            </a:r>
+            <a:r>
+              <a:rPr lang="de-CH" dirty="0" smtClean="0"/>
+              <a:t> System sammelt alle </a:t>
+            </a:r>
+            <a:r>
+              <a:rPr lang="de-CH" dirty="0" err="1" smtClean="0"/>
+              <a:t>Entries</a:t>
+            </a:r>
+            <a:r>
+              <a:rPr lang="de-CH" dirty="0" smtClean="0"/>
+              <a:t> für Morgen</a:t>
+            </a:r>
+            <a:br>
+              <a:rPr lang="de-CH" dirty="0" smtClean="0"/>
+            </a:br>
+            <a:r>
+              <a:rPr lang="de-CH" dirty="0" smtClean="0"/>
+              <a:t>und sendet sie an die App</a:t>
+            </a:r>
+          </a:p>
+          <a:p>
+            <a:r>
+              <a:rPr lang="de-CH" dirty="0" smtClean="0"/>
+              <a:t>App stellt die </a:t>
+            </a:r>
+            <a:r>
+              <a:rPr lang="de-CH" dirty="0" err="1" smtClean="0"/>
+              <a:t>Entries</a:t>
+            </a:r>
+            <a:r>
+              <a:rPr lang="de-CH" dirty="0" smtClean="0"/>
+              <a:t> im Kalender dar</a:t>
+            </a:r>
+          </a:p>
+          <a:p>
+            <a:endParaRPr lang="de-CH" dirty="0" smtClean="0"/>
+          </a:p>
+          <a:p>
+            <a:endParaRPr lang="de-CH" dirty="0" smtClean="0"/>
+          </a:p>
+          <a:p>
+            <a:endParaRPr lang="de-CH" dirty="0" smtClean="0"/>
+          </a:p>
+          <a:p>
+            <a:endParaRPr lang="de-CH" dirty="0"/>
+          </a:p>
+        </p:txBody>
+      </p:sp>
+    </p:spTree>
+    <p:extLst>
+      <p:ext uri="{BB962C8B-B14F-4D97-AF65-F5344CB8AC3E}">
+        <p14:creationId xmlns:p14="http://schemas.microsoft.com/office/powerpoint/2010/main" val="3891332372"/>
+      </p:ext>
+    </p:extLst>
+  </p:cSld>
+  <p:clrMapOvr>
+    <a:masterClrMapping/>
+  </p:clrMapOvr>
+</p:sld>
+</file>
+
+<file path=ppt/slides/slide8.xml><?xml version="1.0" encoding="utf-8"?>
 <p:sld xmlns:a="http://schemas.openxmlformats.org/drawingml/2006/main" xmlns:r="http://schemas.openxmlformats.org/officeDocument/2006/relationships" xmlns:p="http://schemas.openxmlformats.org/presentationml/2006/main">
   <p:cSld>
     <p:spTree>
@@ -4877,7 +5660,7 @@
 </p:sld>
 </file>
 
-<file path=ppt/slides/slide7.xml><?xml version="1.0" encoding="utf-8"?>
+<file path=ppt/slides/slide9.xml><?xml version="1.0" encoding="utf-8"?>
 <p:sld xmlns:a="http://schemas.openxmlformats.org/drawingml/2006/main" xmlns:r="http://schemas.openxmlformats.org/officeDocument/2006/relationships" xmlns:p="http://schemas.openxmlformats.org/presentationml/2006/main">
   <p:cSld>
     <p:spTree>
@@ -4977,184 +5760,6 @@
     <p:extLst>
       <p:ext uri="{BB962C8B-B14F-4D97-AF65-F5344CB8AC3E}">
         <p14:creationId xmlns:p14="http://schemas.microsoft.com/office/powerpoint/2010/main" val="2678445934"/>
-      </p:ext>
-    </p:extLst>
-  </p:cSld>
-  <p:clrMapOvr>
-    <a:masterClrMapping/>
-  </p:clrMapOvr>
-  <p:timing>
-    <p:tnLst>
-      <p:par>
-        <p:cTn id="1" dur="indefinite" restart="never" nodeType="tmRoot"/>
-      </p:par>
-    </p:tnLst>
-  </p:timing>
-</p:sld>
-</file>
-
-<file path=ppt/slides/slide8.xml><?xml version="1.0" encoding="utf-8"?>
-<p:sld xmlns:a="http://schemas.openxmlformats.org/drawingml/2006/main" xmlns:r="http://schemas.openxmlformats.org/officeDocument/2006/relationships" xmlns:p="http://schemas.openxmlformats.org/presentationml/2006/main">
-  <p:cSld>
-    <p:spTree>
-      <p:nvGrpSpPr>
-        <p:cNvPr id="1" name=""/>
-        <p:cNvGrpSpPr/>
-        <p:nvPr/>
-      </p:nvGrpSpPr>
-      <p:grpSpPr>
-        <a:xfrm>
-          <a:off x="0" y="0"/>
-          <a:ext cx="0" cy="0"/>
-          <a:chOff x="0" y="0"/>
-          <a:chExt cx="0" cy="0"/>
-        </a:xfrm>
-      </p:grpSpPr>
-      <p:sp>
-        <p:nvSpPr>
-          <p:cNvPr id="2" name="Titel 1"/>
-          <p:cNvSpPr>
-            <a:spLocks noGrp="1"/>
-          </p:cNvSpPr>
-          <p:nvPr>
-            <p:ph type="title"/>
-          </p:nvPr>
-        </p:nvSpPr>
-        <p:spPr/>
-        <p:txBody>
-          <a:bodyPr/>
-          <a:lstStyle/>
-          <a:p>
-            <a:endParaRPr lang="de-CH"/>
-          </a:p>
-        </p:txBody>
-      </p:sp>
-      <p:pic>
-        <p:nvPicPr>
-          <p:cNvPr id="7170" name="Picture 2" descr="C:\Users\James\workspaceLuna\sed_projekt\doc\task07\classDiagrammSED.png"/>
-          <p:cNvPicPr>
-            <a:picLocks noGrp="1" noChangeAspect="1" noChangeArrowheads="1"/>
-          </p:cNvPicPr>
-          <p:nvPr>
-            <p:ph idx="1"/>
-          </p:nvPr>
-        </p:nvPicPr>
-        <p:blipFill>
-          <a:blip r:embed="rId2">
-            <a:extLst>
-              <a:ext uri="{28A0092B-C50C-407E-A947-70E740481C1C}">
-                <a14:useLocalDpi xmlns:a14="http://schemas.microsoft.com/office/drawing/2010/main" val="0"/>
-              </a:ext>
-            </a:extLst>
-          </a:blip>
-          <a:srcRect/>
-          <a:stretch>
-            <a:fillRect/>
-          </a:stretch>
-        </p:blipFill>
-        <p:spPr bwMode="auto">
-          <a:xfrm>
-            <a:off x="285760" y="0"/>
-            <a:ext cx="8572500" cy="6850172"/>
-          </a:xfrm>
-          <a:prstGeom prst="rect">
-            <a:avLst/>
-          </a:prstGeom>
-          <a:noFill/>
-          <a:extLst>
-            <a:ext uri="{909E8E84-426E-40DD-AFC4-6F175D3DCCD1}">
-              <a14:hiddenFill xmlns:a14="http://schemas.microsoft.com/office/drawing/2010/main">
-                <a:solidFill>
-                  <a:srgbClr val="FFFFFF"/>
-                </a:solidFill>
-              </a14:hiddenFill>
-            </a:ext>
-          </a:extLst>
-        </p:spPr>
-      </p:pic>
-    </p:spTree>
-    <p:extLst>
-      <p:ext uri="{BB962C8B-B14F-4D97-AF65-F5344CB8AC3E}">
-        <p14:creationId xmlns:p14="http://schemas.microsoft.com/office/powerpoint/2010/main" val="3752890489"/>
-      </p:ext>
-    </p:extLst>
-  </p:cSld>
-  <p:clrMapOvr>
-    <a:masterClrMapping/>
-  </p:clrMapOvr>
-  <p:timing>
-    <p:tnLst>
-      <p:par>
-        <p:cTn id="1" dur="indefinite" restart="never" nodeType="tmRoot"/>
-      </p:par>
-    </p:tnLst>
-  </p:timing>
-</p:sld>
-</file>
-
-<file path=ppt/slides/slide9.xml><?xml version="1.0" encoding="utf-8"?>
-<p:sld xmlns:a="http://schemas.openxmlformats.org/drawingml/2006/main" xmlns:r="http://schemas.openxmlformats.org/officeDocument/2006/relationships" xmlns:p="http://schemas.openxmlformats.org/presentationml/2006/main">
-  <p:cSld>
-    <p:spTree>
-      <p:nvGrpSpPr>
-        <p:cNvPr id="1" name=""/>
-        <p:cNvGrpSpPr/>
-        <p:nvPr/>
-      </p:nvGrpSpPr>
-      <p:grpSpPr>
-        <a:xfrm>
-          <a:off x="0" y="0"/>
-          <a:ext cx="0" cy="0"/>
-          <a:chOff x="0" y="0"/>
-          <a:chExt cx="0" cy="0"/>
-        </a:xfrm>
-      </p:grpSpPr>
-      <p:sp>
-        <p:nvSpPr>
-          <p:cNvPr id="2" name="Titel 1"/>
-          <p:cNvSpPr>
-            <a:spLocks noGrp="1"/>
-          </p:cNvSpPr>
-          <p:nvPr>
-            <p:ph type="title"/>
-          </p:nvPr>
-        </p:nvSpPr>
-        <p:spPr/>
-        <p:txBody>
-          <a:bodyPr/>
-          <a:lstStyle/>
-          <a:p>
-            <a:r>
-              <a:rPr lang="en-US" dirty="0" smtClean="0"/>
-              <a:t>Teilausschnitt1</a:t>
-            </a:r>
-            <a:endParaRPr lang="de-CH" dirty="0"/>
-          </a:p>
-        </p:txBody>
-      </p:sp>
-      <p:sp>
-        <p:nvSpPr>
-          <p:cNvPr id="3" name="Inhaltsplatzhalter 2"/>
-          <p:cNvSpPr>
-            <a:spLocks noGrp="1"/>
-          </p:cNvSpPr>
-          <p:nvPr>
-            <p:ph idx="1"/>
-          </p:nvPr>
-        </p:nvSpPr>
-        <p:spPr/>
-        <p:txBody>
-          <a:bodyPr/>
-          <a:lstStyle/>
-          <a:p>
-            <a:endParaRPr lang="de-CH"/>
-          </a:p>
-        </p:txBody>
-      </p:sp>
-    </p:spTree>
-    <p:extLst>
-      <p:ext uri="{BB962C8B-B14F-4D97-AF65-F5344CB8AC3E}">
-        <p14:creationId xmlns:p14="http://schemas.microsoft.com/office/powerpoint/2010/main" val="934797876"/>
       </p:ext>
     </p:extLst>
   </p:cSld>

</xml_diff>

<commit_message>
added presentation and diagramms
</commit_message>
<xml_diff>
--- a/doc/task07/design.pptx
+++ b/doc/task07/design.pptx
@@ -4971,36 +4971,19 @@
           <a:bodyPr/>
           <a:lstStyle/>
           <a:p>
-            <a:endParaRPr lang="de-CH"/>
-          </a:p>
-        </p:txBody>
-      </p:sp>
-      <p:sp>
-        <p:nvSpPr>
-          <p:cNvPr id="3" name="Inhaltsplatzhalter 2"/>
-          <p:cNvSpPr>
-            <a:spLocks noGrp="1"/>
-          </p:cNvSpPr>
-          <p:nvPr>
-            <p:ph idx="1"/>
-          </p:nvPr>
-        </p:nvSpPr>
-        <p:spPr/>
-        <p:txBody>
-          <a:bodyPr/>
-          <a:lstStyle/>
-          <a:p>
-            <a:endParaRPr lang="de-CH"/>
+            <a:endParaRPr lang="de-CH" dirty="0"/>
           </a:p>
         </p:txBody>
       </p:sp>
       <p:pic>
         <p:nvPicPr>
-          <p:cNvPr id="1027" name="Picture 3" descr="C:\Users\James\workspaceLuna\sed_projekt\doc\task07\classDiagrammSED.png"/>
+          <p:cNvPr id="1028" name="Picture 4" descr="C:\Users\James\workspaceLuna\sed_projekt\doc\task07\classDiagrammSED.png"/>
           <p:cNvPicPr>
-            <a:picLocks noChangeAspect="1" noChangeArrowheads="1"/>
+            <a:picLocks noGrp="1" noChangeAspect="1" noChangeArrowheads="1"/>
           </p:cNvPicPr>
-          <p:nvPr/>
+          <p:nvPr>
+            <p:ph idx="1"/>
+          </p:nvPr>
         </p:nvPicPr>
         <p:blipFill>
           <a:blip r:embed="rId3">
@@ -5017,8 +5000,8 @@
         </p:blipFill>
         <p:spPr bwMode="auto">
           <a:xfrm>
-            <a:off x="457200" y="141288"/>
-            <a:ext cx="8101013" cy="6414830"/>
+            <a:off x="266700" y="57150"/>
+            <a:ext cx="8686800" cy="6407007"/>
           </a:xfrm>
           <a:prstGeom prst="rect">
             <a:avLst/>
@@ -5357,7 +5340,7 @@
           <a:lstStyle/>
           <a:p>
             <a:r>
-              <a:rPr lang="de-CH" smtClean="0"/>
+              <a:rPr lang="de-CH" dirty="0" smtClean="0"/>
               <a:t>Fragen?</a:t>
             </a:r>
             <a:endParaRPr lang="de-CH" dirty="0"/>

</xml_diff>